<commit_message>
A couple of tweaks to date processing for test data.  Forgot to do within a branch :-)
</commit_message>
<xml_diff>
--- a/source/tests/test_resources/input_files/ppt_templates/PlanVisual-01.pptx
+++ b/source/tests/test_resources/input_files/ppt_templates/PlanVisual-01.pptx
@@ -2814,7 +2814,13 @@
             <p:ph type="title"/>
           </p:nvPr>
         </p:nvSpPr>
-        <p:spPr/>
+        <p:spPr>
+          <a:solidFill>
+            <a:schemeClr val="bg1">
+              <a:lumMod val="85000"/>
+            </a:schemeClr>
+          </a:solidFill>
+        </p:spPr>
         <p:txBody>
           <a:bodyPr/>
           <a:lstStyle/>
@@ -2847,9 +2853,8 @@
             <a:avLst/>
           </a:prstGeom>
           <a:solidFill>
-            <a:schemeClr val="accent1">
-              <a:lumMod val="60000"/>
-              <a:lumOff val="40000"/>
+            <a:schemeClr val="bg1">
+              <a:lumMod val="85000"/>
             </a:schemeClr>
           </a:solidFill>
           <a:ln>
@@ -2902,9 +2907,8 @@
             <a:avLst/>
           </a:prstGeom>
           <a:solidFill>
-            <a:schemeClr val="accent5">
-              <a:lumMod val="20000"/>
-              <a:lumOff val="80000"/>
+            <a:schemeClr val="bg1">
+              <a:lumMod val="85000"/>
             </a:schemeClr>
           </a:solidFill>
         </p:spPr>
@@ -2948,9 +2952,8 @@
             <a:avLst/>
           </a:prstGeom>
           <a:solidFill>
-            <a:schemeClr val="accent5">
-              <a:lumMod val="20000"/>
-              <a:lumOff val="80000"/>
+            <a:schemeClr val="bg1">
+              <a:lumMod val="85000"/>
             </a:schemeClr>
           </a:solidFill>
         </p:spPr>

</xml_diff>